<commit_message>
Rev3.0 - Add table of contents
</commit_message>
<xml_diff>
--- a/Presentation.pptx
+++ b/Presentation.pptx
@@ -5473,7 +5473,7 @@
         <p:spPr>
           <a:xfrm>
             <a:off x="758282" y="1851103"/>
-            <a:ext cx="10470995" cy="4401205"/>
+            <a:ext cx="10470995" cy="3421899"/>
           </a:xfrm>
           <a:prstGeom prst="rect">
             <a:avLst/>
@@ -5488,7 +5488,7 @@
           <a:p>
             <a:pPr marL="457200" indent="-457200">
               <a:lnSpc>
-                <a:spcPct val="150000"/>
+                <a:spcPct val="200000"/>
               </a:lnSpc>
               <a:buFont typeface="Arial" panose="020B0604020202020204" pitchFamily="34" charset="0"/>
               <a:buChar char="•"/>
@@ -5499,13 +5499,13 @@
                 <a:ea typeface="JetBrains Mono" panose="02000009000000000000" pitchFamily="49" charset="0"/>
                 <a:cs typeface="JetBrains Mono" panose="02000009000000000000" pitchFamily="49" charset="0"/>
               </a:rPr>
-              <a:t>Questionnaire design</a:t>
-            </a:r>
-          </a:p>
-          <a:p>
-            <a:pPr marL="914400" lvl="1" indent="-457200">
+              <a:t>Designing your questionnaire</a:t>
+            </a:r>
+          </a:p>
+          <a:p>
+            <a:pPr marL="457200" indent="-457200">
               <a:lnSpc>
-                <a:spcPct val="150000"/>
+                <a:spcPct val="200000"/>
               </a:lnSpc>
               <a:buFont typeface="Arial" panose="020B0604020202020204" pitchFamily="34" charset="0"/>
               <a:buChar char="•"/>
@@ -5516,79 +5516,36 @@
                 <a:ea typeface="JetBrains Mono" panose="02000009000000000000" pitchFamily="49" charset="0"/>
                 <a:cs typeface="JetBrains Mono" panose="02000009000000000000" pitchFamily="49" charset="0"/>
               </a:rPr>
-              <a:t>Appearance</a:t>
-            </a:r>
-          </a:p>
-          <a:p>
-            <a:pPr marL="914400" lvl="1" indent="-457200">
+              <a:t>Before you administer your questionnaire…</a:t>
+            </a:r>
+          </a:p>
+          <a:p>
+            <a:pPr marL="457200" indent="-457200">
               <a:lnSpc>
-                <a:spcPct val="150000"/>
+                <a:spcPct val="200000"/>
               </a:lnSpc>
               <a:buFont typeface="Arial" panose="020B0604020202020204" pitchFamily="34" charset="0"/>
               <a:buChar char="•"/>
             </a:pPr>
             <a:r>
-              <a:rPr lang="en-US" sz="2800" dirty="0">
+              <a:rPr lang="en-US" sz="2800">
                 <a:latin typeface="JetBrains Mono" panose="02000009000000000000" pitchFamily="49" charset="0"/>
                 <a:ea typeface="JetBrains Mono" panose="02000009000000000000" pitchFamily="49" charset="0"/>
                 <a:cs typeface="JetBrains Mono" panose="02000009000000000000" pitchFamily="49" charset="0"/>
               </a:rPr>
-              <a:t>Question design</a:t>
-            </a:r>
+              <a:t>Data analysis</a:t>
+            </a:r>
+            <a:endParaRPr lang="en-US" sz="2800" dirty="0">
+              <a:latin typeface="JetBrains Mono" panose="02000009000000000000" pitchFamily="49" charset="0"/>
+              <a:ea typeface="JetBrains Mono" panose="02000009000000000000" pitchFamily="49" charset="0"/>
+              <a:cs typeface="JetBrains Mono" panose="02000009000000000000" pitchFamily="49" charset="0"/>
+            </a:endParaRPr>
           </a:p>
           <a:p>
             <a:pPr marL="457200" indent="-457200">
               <a:lnSpc>
-                <a:spcPct val="150000"/>
+                <a:spcPct val="200000"/>
               </a:lnSpc>
-              <a:buFont typeface="Arial" panose="020B0604020202020204" pitchFamily="34" charset="0"/>
-              <a:buChar char="•"/>
-            </a:pPr>
-            <a:r>
-              <a:rPr lang="en-US" sz="2800" dirty="0">
-                <a:latin typeface="JetBrains Mono" panose="02000009000000000000" pitchFamily="49" charset="0"/>
-                <a:ea typeface="JetBrains Mono" panose="02000009000000000000" pitchFamily="49" charset="0"/>
-                <a:cs typeface="JetBrains Mono" panose="02000009000000000000" pitchFamily="49" charset="0"/>
-              </a:rPr>
-              <a:t>Questionnaire data analysis</a:t>
-            </a:r>
-          </a:p>
-          <a:p>
-            <a:pPr marL="914400" lvl="1" indent="-457200">
-              <a:lnSpc>
-                <a:spcPct val="150000"/>
-              </a:lnSpc>
-              <a:buFont typeface="Arial" panose="020B0604020202020204" pitchFamily="34" charset="0"/>
-              <a:buChar char="•"/>
-            </a:pPr>
-            <a:r>
-              <a:rPr lang="en-US" sz="2800" dirty="0">
-                <a:latin typeface="JetBrains Mono" panose="02000009000000000000" pitchFamily="49" charset="0"/>
-                <a:ea typeface="JetBrains Mono" panose="02000009000000000000" pitchFamily="49" charset="0"/>
-                <a:cs typeface="JetBrains Mono" panose="02000009000000000000" pitchFamily="49" charset="0"/>
-              </a:rPr>
-              <a:t>Quantitative data</a:t>
-            </a:r>
-          </a:p>
-          <a:p>
-            <a:pPr marL="914400" lvl="1" indent="-457200">
-              <a:lnSpc>
-                <a:spcPct val="150000"/>
-              </a:lnSpc>
-              <a:buFont typeface="Arial" panose="020B0604020202020204" pitchFamily="34" charset="0"/>
-              <a:buChar char="•"/>
-            </a:pPr>
-            <a:r>
-              <a:rPr lang="en-US" sz="2800" dirty="0">
-                <a:latin typeface="JetBrains Mono" panose="02000009000000000000" pitchFamily="49" charset="0"/>
-                <a:ea typeface="JetBrains Mono" panose="02000009000000000000" pitchFamily="49" charset="0"/>
-                <a:cs typeface="JetBrains Mono" panose="02000009000000000000" pitchFamily="49" charset="0"/>
-              </a:rPr>
-              <a:t>Qualitative data</a:t>
-            </a:r>
-          </a:p>
-          <a:p>
-            <a:pPr marL="914400" lvl="1" indent="-457200">
               <a:buFont typeface="Arial" panose="020B0604020202020204" pitchFamily="34" charset="0"/>
               <a:buChar char="•"/>
             </a:pPr>

</xml_diff>